<commit_message>
subida final, ultimos arreglos de tipeo
</commit_message>
<xml_diff>
--- a/Proyecto_final/Presentacion.pptx
+++ b/Proyecto_final/Presentacion.pptx
@@ -3569,7 +3569,7 @@
             </a:r>
             <a:r>
               <a:rPr lang="en-US" dirty="0"/>
-              <a:t> / Jarque-Bera 0,0016</a:t>
+              <a:t> / Jarque-Bera 0,09063</a:t>
             </a:r>
           </a:p>
           <a:p>
@@ -3587,7 +3587,7 @@
             </a:r>
             <a:r>
               <a:rPr lang="en-US" dirty="0"/>
-              <a:t>-box 0,7361</a:t>
+              <a:t>-box 0,6672</a:t>
             </a:r>
           </a:p>
           <a:p>
@@ -3597,7 +3597,7 @@
             </a:r>
             <a:r>
               <a:rPr lang="en-US" dirty="0"/>
-              <a:t> / Breusch-Pagan 0,6713 </a:t>
+              <a:t> / Breusch-Pagan 0,6415 </a:t>
             </a:r>
           </a:p>
           <a:p>
@@ -4039,10 +4039,10 @@
       </p:sp>
       <p:pic>
         <p:nvPicPr>
-          <p:cNvPr id="9" name="Imagen 8">
+          <p:cNvPr id="2" name="Imagen 1">
             <a:extLst>
               <a:ext uri="{FF2B5EF4-FFF2-40B4-BE49-F238E27FC236}">
-                <a16:creationId xmlns:a16="http://schemas.microsoft.com/office/drawing/2014/main" id="{7FCDC6D4-1936-B58D-25A0-AB09245ABC1F}"/>
+                <a16:creationId xmlns:a16="http://schemas.microsoft.com/office/drawing/2014/main" id="{79B17104-CBC4-24EF-37BE-6C7182FB7E9D}"/>
               </a:ext>
             </a:extLst>
           </p:cNvPr>
@@ -4059,8 +4059,8 @@
         </p:blipFill>
         <p:spPr>
           <a:xfrm>
-            <a:off x="5798586" y="1177174"/>
-            <a:ext cx="6012795" cy="4524375"/>
+            <a:off x="33570" y="1166812"/>
+            <a:ext cx="5765015" cy="4524375"/>
           </a:xfrm>
           <a:prstGeom prst="rect">
             <a:avLst/>
@@ -4069,10 +4069,10 @@
       </p:pic>
       <p:pic>
         <p:nvPicPr>
-          <p:cNvPr id="10" name="Imagen 9">
+          <p:cNvPr id="3" name="Imagen 2">
             <a:extLst>
               <a:ext uri="{FF2B5EF4-FFF2-40B4-BE49-F238E27FC236}">
-                <a16:creationId xmlns:a16="http://schemas.microsoft.com/office/drawing/2014/main" id="{AA89C03C-9B72-53EB-8903-53AD1AB34337}"/>
+                <a16:creationId xmlns:a16="http://schemas.microsoft.com/office/drawing/2014/main" id="{CEF29519-432B-BA7E-2815-3EE587986AD2}"/>
               </a:ext>
             </a:extLst>
           </p:cNvPr>
@@ -4089,8 +4089,8 @@
         </p:blipFill>
         <p:spPr>
           <a:xfrm>
-            <a:off x="125877" y="1177175"/>
-            <a:ext cx="5672709" cy="4524375"/>
+            <a:off x="5798585" y="1166811"/>
+            <a:ext cx="6359845" cy="4524375"/>
           </a:xfrm>
           <a:prstGeom prst="rect">
             <a:avLst/>

</xml_diff>